<commit_message>
Snake and ladder whole game
</commit_message>
<xml_diff>
--- a/Snake and ladder class and object oops diagram.pptx
+++ b/Snake and ladder class and object oops diagram.pptx
@@ -9,6 +9,7 @@
     <p:sldId id="257" r:id="rId3"/>
     <p:sldId id="258" r:id="rId4"/>
     <p:sldId id="259" r:id="rId5"/>
+    <p:sldId id="260" r:id="rId6"/>
   </p:sldIdLst>
   <p:sldSz cx="12192000" cy="6858000"/>
   <p:notesSz cx="6858000" cy="9144000"/>
@@ -107,6 +108,11 @@
       </a:defRPr>
     </a:lvl9pPr>
   </p:defaultTextStyle>
+  <p:extLst>
+    <p:ext uri="{EFAFB233-063F-42B5-8137-9DF3F51BA10A}">
+      <p15:sldGuideLst xmlns:p15="http://schemas.microsoft.com/office/powerpoint/2012/main"/>
+    </p:ext>
+  </p:extLst>
 </p:presentation>
 </file>
 
@@ -259,7 +265,7 @@
           <a:p>
             <a:fld id="{A0F90BDD-EFA8-4FDF-9360-3A92F0A1C4D3}" type="datetimeFigureOut">
               <a:rPr lang="en-AU" smtClean="0"/>
-              <a:t>19/09/2022</a:t>
+              <a:t>18/11/2022</a:t>
             </a:fld>
             <a:endParaRPr lang="en-AU"/>
           </a:p>
@@ -459,7 +465,7 @@
           <a:p>
             <a:fld id="{A0F90BDD-EFA8-4FDF-9360-3A92F0A1C4D3}" type="datetimeFigureOut">
               <a:rPr lang="en-AU" smtClean="0"/>
-              <a:t>19/09/2022</a:t>
+              <a:t>18/11/2022</a:t>
             </a:fld>
             <a:endParaRPr lang="en-AU"/>
           </a:p>
@@ -669,7 +675,7 @@
           <a:p>
             <a:fld id="{A0F90BDD-EFA8-4FDF-9360-3A92F0A1C4D3}" type="datetimeFigureOut">
               <a:rPr lang="en-AU" smtClean="0"/>
-              <a:t>19/09/2022</a:t>
+              <a:t>18/11/2022</a:t>
             </a:fld>
             <a:endParaRPr lang="en-AU"/>
           </a:p>
@@ -869,7 +875,7 @@
           <a:p>
             <a:fld id="{A0F90BDD-EFA8-4FDF-9360-3A92F0A1C4D3}" type="datetimeFigureOut">
               <a:rPr lang="en-AU" smtClean="0"/>
-              <a:t>19/09/2022</a:t>
+              <a:t>18/11/2022</a:t>
             </a:fld>
             <a:endParaRPr lang="en-AU"/>
           </a:p>
@@ -1145,7 +1151,7 @@
           <a:p>
             <a:fld id="{A0F90BDD-EFA8-4FDF-9360-3A92F0A1C4D3}" type="datetimeFigureOut">
               <a:rPr lang="en-AU" smtClean="0"/>
-              <a:t>19/09/2022</a:t>
+              <a:t>18/11/2022</a:t>
             </a:fld>
             <a:endParaRPr lang="en-AU"/>
           </a:p>
@@ -1413,7 +1419,7 @@
           <a:p>
             <a:fld id="{A0F90BDD-EFA8-4FDF-9360-3A92F0A1C4D3}" type="datetimeFigureOut">
               <a:rPr lang="en-AU" smtClean="0"/>
-              <a:t>19/09/2022</a:t>
+              <a:t>18/11/2022</a:t>
             </a:fld>
             <a:endParaRPr lang="en-AU"/>
           </a:p>
@@ -1828,7 +1834,7 @@
           <a:p>
             <a:fld id="{A0F90BDD-EFA8-4FDF-9360-3A92F0A1C4D3}" type="datetimeFigureOut">
               <a:rPr lang="en-AU" smtClean="0"/>
-              <a:t>19/09/2022</a:t>
+              <a:t>18/11/2022</a:t>
             </a:fld>
             <a:endParaRPr lang="en-AU"/>
           </a:p>
@@ -1970,7 +1976,7 @@
           <a:p>
             <a:fld id="{A0F90BDD-EFA8-4FDF-9360-3A92F0A1C4D3}" type="datetimeFigureOut">
               <a:rPr lang="en-AU" smtClean="0"/>
-              <a:t>19/09/2022</a:t>
+              <a:t>18/11/2022</a:t>
             </a:fld>
             <a:endParaRPr lang="en-AU"/>
           </a:p>
@@ -2083,7 +2089,7 @@
           <a:p>
             <a:fld id="{A0F90BDD-EFA8-4FDF-9360-3A92F0A1C4D3}" type="datetimeFigureOut">
               <a:rPr lang="en-AU" smtClean="0"/>
-              <a:t>19/09/2022</a:t>
+              <a:t>18/11/2022</a:t>
             </a:fld>
             <a:endParaRPr lang="en-AU"/>
           </a:p>
@@ -2396,7 +2402,7 @@
           <a:p>
             <a:fld id="{A0F90BDD-EFA8-4FDF-9360-3A92F0A1C4D3}" type="datetimeFigureOut">
               <a:rPr lang="en-AU" smtClean="0"/>
-              <a:t>19/09/2022</a:t>
+              <a:t>18/11/2022</a:t>
             </a:fld>
             <a:endParaRPr lang="en-AU"/>
           </a:p>
@@ -2685,7 +2691,7 @@
           <a:p>
             <a:fld id="{A0F90BDD-EFA8-4FDF-9360-3A92F0A1C4D3}" type="datetimeFigureOut">
               <a:rPr lang="en-AU" smtClean="0"/>
-              <a:t>19/09/2022</a:t>
+              <a:t>18/11/2022</a:t>
             </a:fld>
             <a:endParaRPr lang="en-AU"/>
           </a:p>
@@ -2928,7 +2934,7 @@
           <a:p>
             <a:fld id="{A0F90BDD-EFA8-4FDF-9360-3A92F0A1C4D3}" type="datetimeFigureOut">
               <a:rPr lang="en-AU" smtClean="0"/>
-              <a:t>19/09/2022</a:t>
+              <a:t>18/11/2022</a:t>
             </a:fld>
             <a:endParaRPr lang="en-AU"/>
           </a:p>
@@ -5534,6 +5540,428 @@
 </p:sld>
 </file>
 
+<file path=ppt/slides/slide5.xml><?xml version="1.0" encoding="utf-8"?>
+<p:sld xmlns:a="http://schemas.openxmlformats.org/drawingml/2006/main" xmlns:r="http://schemas.openxmlformats.org/officeDocument/2006/relationships" xmlns:p="http://schemas.openxmlformats.org/presentationml/2006/main">
+  <p:cSld>
+    <p:spTree>
+      <p:nvGrpSpPr>
+        <p:cNvPr id="1" name=""/>
+        <p:cNvGrpSpPr/>
+        <p:nvPr/>
+      </p:nvGrpSpPr>
+      <p:grpSpPr>
+        <a:xfrm>
+          <a:off x="0" y="0"/>
+          <a:ext cx="0" cy="0"/>
+          <a:chOff x="0" y="0"/>
+          <a:chExt cx="0" cy="0"/>
+        </a:xfrm>
+      </p:grpSpPr>
+      <p:pic>
+        <p:nvPicPr>
+          <p:cNvPr id="3" name="Picture 2">
+            <a:extLst>
+              <a:ext uri="{FF2B5EF4-FFF2-40B4-BE49-F238E27FC236}">
+                <a16:creationId xmlns:a16="http://schemas.microsoft.com/office/drawing/2014/main" id="{06F4C84D-99C6-231E-A391-81A97F222A29}"/>
+              </a:ext>
+            </a:extLst>
+          </p:cNvPr>
+          <p:cNvPicPr>
+            <a:picLocks noChangeAspect="1"/>
+          </p:cNvPicPr>
+          <p:nvPr/>
+        </p:nvPicPr>
+        <p:blipFill>
+          <a:blip r:embed="rId2">
+            <a:extLst>
+              <a:ext uri="{28A0092B-C50C-407E-A947-70E740481C1C}">
+                <a14:useLocalDpi xmlns:a14="http://schemas.microsoft.com/office/drawing/2010/main" val="0"/>
+              </a:ext>
+            </a:extLst>
+          </a:blip>
+          <a:stretch>
+            <a:fillRect/>
+          </a:stretch>
+        </p:blipFill>
+        <p:spPr>
+          <a:xfrm>
+            <a:off x="0" y="0"/>
+            <a:ext cx="12192000" cy="6858000"/>
+          </a:xfrm>
+          <a:prstGeom prst="rect">
+            <a:avLst/>
+          </a:prstGeom>
+        </p:spPr>
+      </p:pic>
+      <p:cxnSp>
+        <p:nvCxnSpPr>
+          <p:cNvPr id="5" name="Straight Arrow Connector 4">
+            <a:extLst>
+              <a:ext uri="{FF2B5EF4-FFF2-40B4-BE49-F238E27FC236}">
+                <a16:creationId xmlns:a16="http://schemas.microsoft.com/office/drawing/2014/main" id="{1A7D10DA-964C-9571-B026-EE422DD25CED}"/>
+              </a:ext>
+            </a:extLst>
+          </p:cNvPr>
+          <p:cNvCxnSpPr/>
+          <p:nvPr/>
+        </p:nvCxnSpPr>
+        <p:spPr>
+          <a:xfrm>
+            <a:off x="138223" y="3083442"/>
+            <a:ext cx="2020186" cy="0"/>
+          </a:xfrm>
+          <a:prstGeom prst="straightConnector1">
+            <a:avLst/>
+          </a:prstGeom>
+          <a:ln>
+            <a:solidFill>
+              <a:schemeClr val="bg1"/>
+            </a:solidFill>
+            <a:tailEnd type="triangle"/>
+          </a:ln>
+        </p:spPr>
+        <p:style>
+          <a:lnRef idx="3">
+            <a:schemeClr val="accent1"/>
+          </a:lnRef>
+          <a:fillRef idx="0">
+            <a:schemeClr val="accent1"/>
+          </a:fillRef>
+          <a:effectRef idx="2">
+            <a:schemeClr val="accent1"/>
+          </a:effectRef>
+          <a:fontRef idx="minor">
+            <a:schemeClr val="tx1"/>
+          </a:fontRef>
+        </p:style>
+      </p:cxnSp>
+      <p:cxnSp>
+        <p:nvCxnSpPr>
+          <p:cNvPr id="6" name="Straight Arrow Connector 5">
+            <a:extLst>
+              <a:ext uri="{FF2B5EF4-FFF2-40B4-BE49-F238E27FC236}">
+                <a16:creationId xmlns:a16="http://schemas.microsoft.com/office/drawing/2014/main" id="{7BCF1DC6-35F7-305B-B364-47B4CA06B216}"/>
+              </a:ext>
+            </a:extLst>
+          </p:cNvPr>
+          <p:cNvCxnSpPr/>
+          <p:nvPr/>
+        </p:nvCxnSpPr>
+        <p:spPr>
+          <a:xfrm>
+            <a:off x="9891823" y="3083442"/>
+            <a:ext cx="2020186" cy="0"/>
+          </a:xfrm>
+          <a:prstGeom prst="straightConnector1">
+            <a:avLst/>
+          </a:prstGeom>
+          <a:ln>
+            <a:solidFill>
+              <a:schemeClr val="bg1"/>
+            </a:solidFill>
+            <a:tailEnd type="triangle"/>
+          </a:ln>
+        </p:spPr>
+        <p:style>
+          <a:lnRef idx="3">
+            <a:schemeClr val="accent1"/>
+          </a:lnRef>
+          <a:fillRef idx="0">
+            <a:schemeClr val="accent1"/>
+          </a:fillRef>
+          <a:effectRef idx="2">
+            <a:schemeClr val="accent1"/>
+          </a:effectRef>
+          <a:fontRef idx="minor">
+            <a:schemeClr val="tx1"/>
+          </a:fontRef>
+        </p:style>
+      </p:cxnSp>
+      <p:cxnSp>
+        <p:nvCxnSpPr>
+          <p:cNvPr id="7" name="Straight Arrow Connector 6">
+            <a:extLst>
+              <a:ext uri="{FF2B5EF4-FFF2-40B4-BE49-F238E27FC236}">
+                <a16:creationId xmlns:a16="http://schemas.microsoft.com/office/drawing/2014/main" id="{C835EBD8-4600-25ED-E085-DEE6E81F6C53}"/>
+              </a:ext>
+            </a:extLst>
+          </p:cNvPr>
+          <p:cNvCxnSpPr>
+            <a:cxnSpLocks/>
+          </p:cNvCxnSpPr>
+          <p:nvPr/>
+        </p:nvCxnSpPr>
+        <p:spPr>
+          <a:xfrm flipH="1">
+            <a:off x="138223" y="3820632"/>
+            <a:ext cx="2020186" cy="0"/>
+          </a:xfrm>
+          <a:prstGeom prst="straightConnector1">
+            <a:avLst/>
+          </a:prstGeom>
+          <a:ln>
+            <a:solidFill>
+              <a:schemeClr val="bg1"/>
+            </a:solidFill>
+            <a:tailEnd type="triangle"/>
+          </a:ln>
+        </p:spPr>
+        <p:style>
+          <a:lnRef idx="3">
+            <a:schemeClr val="accent1"/>
+          </a:lnRef>
+          <a:fillRef idx="0">
+            <a:schemeClr val="accent1"/>
+          </a:fillRef>
+          <a:effectRef idx="2">
+            <a:schemeClr val="accent1"/>
+          </a:effectRef>
+          <a:fontRef idx="minor">
+            <a:schemeClr val="tx1"/>
+          </a:fontRef>
+        </p:style>
+      </p:cxnSp>
+      <p:cxnSp>
+        <p:nvCxnSpPr>
+          <p:cNvPr id="8" name="Straight Arrow Connector 7">
+            <a:extLst>
+              <a:ext uri="{FF2B5EF4-FFF2-40B4-BE49-F238E27FC236}">
+                <a16:creationId xmlns:a16="http://schemas.microsoft.com/office/drawing/2014/main" id="{716099B8-CE12-F18A-F954-95B1851D00C0}"/>
+              </a:ext>
+            </a:extLst>
+          </p:cNvPr>
+          <p:cNvCxnSpPr>
+            <a:cxnSpLocks/>
+          </p:cNvCxnSpPr>
+          <p:nvPr/>
+        </p:nvCxnSpPr>
+        <p:spPr>
+          <a:xfrm flipV="1">
+            <a:off x="5415516" y="216195"/>
+            <a:ext cx="0" cy="1166038"/>
+          </a:xfrm>
+          <a:prstGeom prst="straightConnector1">
+            <a:avLst/>
+          </a:prstGeom>
+          <a:ln>
+            <a:solidFill>
+              <a:schemeClr val="bg1"/>
+            </a:solidFill>
+            <a:tailEnd type="triangle"/>
+          </a:ln>
+        </p:spPr>
+        <p:style>
+          <a:lnRef idx="3">
+            <a:schemeClr val="accent1"/>
+          </a:lnRef>
+          <a:fillRef idx="0">
+            <a:schemeClr val="accent1"/>
+          </a:fillRef>
+          <a:effectRef idx="2">
+            <a:schemeClr val="accent1"/>
+          </a:effectRef>
+          <a:fontRef idx="minor">
+            <a:schemeClr val="tx1"/>
+          </a:fontRef>
+        </p:style>
+      </p:cxnSp>
+      <p:cxnSp>
+        <p:nvCxnSpPr>
+          <p:cNvPr id="10" name="Straight Arrow Connector 9">
+            <a:extLst>
+              <a:ext uri="{FF2B5EF4-FFF2-40B4-BE49-F238E27FC236}">
+                <a16:creationId xmlns:a16="http://schemas.microsoft.com/office/drawing/2014/main" id="{FF942BA4-4711-36E2-E4CF-591DB5236FAC}"/>
+              </a:ext>
+            </a:extLst>
+          </p:cNvPr>
+          <p:cNvCxnSpPr>
+            <a:cxnSpLocks/>
+          </p:cNvCxnSpPr>
+          <p:nvPr/>
+        </p:nvCxnSpPr>
+        <p:spPr>
+          <a:xfrm flipV="1">
+            <a:off x="5493488" y="5606898"/>
+            <a:ext cx="0" cy="1166038"/>
+          </a:xfrm>
+          <a:prstGeom prst="straightConnector1">
+            <a:avLst/>
+          </a:prstGeom>
+          <a:ln>
+            <a:solidFill>
+              <a:schemeClr val="bg1"/>
+            </a:solidFill>
+            <a:tailEnd type="triangle"/>
+          </a:ln>
+        </p:spPr>
+        <p:style>
+          <a:lnRef idx="3">
+            <a:schemeClr val="accent1"/>
+          </a:lnRef>
+          <a:fillRef idx="0">
+            <a:schemeClr val="accent1"/>
+          </a:fillRef>
+          <a:effectRef idx="2">
+            <a:schemeClr val="accent1"/>
+          </a:effectRef>
+          <a:fontRef idx="minor">
+            <a:schemeClr val="tx1"/>
+          </a:fontRef>
+        </p:style>
+      </p:cxnSp>
+      <p:cxnSp>
+        <p:nvCxnSpPr>
+          <p:cNvPr id="11" name="Straight Arrow Connector 10">
+            <a:extLst>
+              <a:ext uri="{FF2B5EF4-FFF2-40B4-BE49-F238E27FC236}">
+                <a16:creationId xmlns:a16="http://schemas.microsoft.com/office/drawing/2014/main" id="{F2D116BA-076F-8A32-E86B-B02DB4B469AC}"/>
+              </a:ext>
+            </a:extLst>
+          </p:cNvPr>
+          <p:cNvCxnSpPr>
+            <a:cxnSpLocks/>
+          </p:cNvCxnSpPr>
+          <p:nvPr/>
+        </p:nvCxnSpPr>
+        <p:spPr>
+          <a:xfrm>
+            <a:off x="6741042" y="5606898"/>
+            <a:ext cx="0" cy="1166038"/>
+          </a:xfrm>
+          <a:prstGeom prst="straightConnector1">
+            <a:avLst/>
+          </a:prstGeom>
+          <a:ln>
+            <a:solidFill>
+              <a:schemeClr val="bg1"/>
+            </a:solidFill>
+            <a:tailEnd type="triangle"/>
+          </a:ln>
+        </p:spPr>
+        <p:style>
+          <a:lnRef idx="3">
+            <a:schemeClr val="accent1"/>
+          </a:lnRef>
+          <a:fillRef idx="0">
+            <a:schemeClr val="accent1"/>
+          </a:fillRef>
+          <a:effectRef idx="2">
+            <a:schemeClr val="accent1"/>
+          </a:effectRef>
+          <a:fontRef idx="minor">
+            <a:schemeClr val="tx1"/>
+          </a:fontRef>
+        </p:style>
+      </p:cxnSp>
+      <p:cxnSp>
+        <p:nvCxnSpPr>
+          <p:cNvPr id="13" name="Straight Arrow Connector 12">
+            <a:extLst>
+              <a:ext uri="{FF2B5EF4-FFF2-40B4-BE49-F238E27FC236}">
+                <a16:creationId xmlns:a16="http://schemas.microsoft.com/office/drawing/2014/main" id="{F9B58486-7B13-317B-C006-E198ADC391D1}"/>
+              </a:ext>
+            </a:extLst>
+          </p:cNvPr>
+          <p:cNvCxnSpPr>
+            <a:cxnSpLocks/>
+          </p:cNvCxnSpPr>
+          <p:nvPr/>
+        </p:nvCxnSpPr>
+        <p:spPr>
+          <a:xfrm>
+            <a:off x="6648893" y="216195"/>
+            <a:ext cx="0" cy="1166038"/>
+          </a:xfrm>
+          <a:prstGeom prst="straightConnector1">
+            <a:avLst/>
+          </a:prstGeom>
+          <a:ln>
+            <a:solidFill>
+              <a:schemeClr val="bg1"/>
+            </a:solidFill>
+            <a:tailEnd type="triangle"/>
+          </a:ln>
+        </p:spPr>
+        <p:style>
+          <a:lnRef idx="3">
+            <a:schemeClr val="accent1"/>
+          </a:lnRef>
+          <a:fillRef idx="0">
+            <a:schemeClr val="accent1"/>
+          </a:fillRef>
+          <a:effectRef idx="2">
+            <a:schemeClr val="accent1"/>
+          </a:effectRef>
+          <a:fontRef idx="minor">
+            <a:schemeClr val="tx1"/>
+          </a:fontRef>
+        </p:style>
+      </p:cxnSp>
+      <p:cxnSp>
+        <p:nvCxnSpPr>
+          <p:cNvPr id="14" name="Straight Arrow Connector 13">
+            <a:extLst>
+              <a:ext uri="{FF2B5EF4-FFF2-40B4-BE49-F238E27FC236}">
+                <a16:creationId xmlns:a16="http://schemas.microsoft.com/office/drawing/2014/main" id="{799C5738-D161-11B7-2071-764221B4E65E}"/>
+              </a:ext>
+            </a:extLst>
+          </p:cNvPr>
+          <p:cNvCxnSpPr>
+            <a:cxnSpLocks/>
+          </p:cNvCxnSpPr>
+          <p:nvPr/>
+        </p:nvCxnSpPr>
+        <p:spPr>
+          <a:xfrm flipH="1">
+            <a:off x="9891823" y="3806455"/>
+            <a:ext cx="2020186" cy="0"/>
+          </a:xfrm>
+          <a:prstGeom prst="straightConnector1">
+            <a:avLst/>
+          </a:prstGeom>
+          <a:ln>
+            <a:solidFill>
+              <a:schemeClr val="bg1"/>
+            </a:solidFill>
+            <a:tailEnd type="triangle"/>
+          </a:ln>
+        </p:spPr>
+        <p:style>
+          <a:lnRef idx="3">
+            <a:schemeClr val="accent1"/>
+          </a:lnRef>
+          <a:fillRef idx="0">
+            <a:schemeClr val="accent1"/>
+          </a:fillRef>
+          <a:effectRef idx="2">
+            <a:schemeClr val="accent1"/>
+          </a:effectRef>
+          <a:fontRef idx="minor">
+            <a:schemeClr val="tx1"/>
+          </a:fontRef>
+        </p:style>
+      </p:cxnSp>
+    </p:spTree>
+    <p:extLst>
+      <p:ext uri="{BB962C8B-B14F-4D97-AF65-F5344CB8AC3E}">
+        <p14:creationId xmlns:p14="http://schemas.microsoft.com/office/powerpoint/2010/main" val="3613246632"/>
+      </p:ext>
+    </p:extLst>
+  </p:cSld>
+  <p:clrMapOvr>
+    <a:masterClrMapping/>
+  </p:clrMapOvr>
+  <mc:AlternateContent xmlns:mc="http://schemas.openxmlformats.org/markup-compatibility/2006" xmlns:p14="http://schemas.microsoft.com/office/powerpoint/2010/main">
+    <mc:Choice Requires="p14">
+      <p:transition spd="slow" p14:dur="2000" advTm="31602"/>
+    </mc:Choice>
+    <mc:Fallback xmlns="">
+      <p:transition spd="slow" advTm="31602"/>
+    </mc:Fallback>
+  </mc:AlternateContent>
+</p:sld>
+</file>
+
 <file path=ppt/theme/theme1.xml><?xml version="1.0" encoding="utf-8"?>
 <a:theme xmlns:a="http://schemas.openxmlformats.org/drawingml/2006/main" name="Office Theme">
   <a:themeElements>

</xml_diff>